<commit_message>
Alterado requisitos da apresentação
</commit_message>
<xml_diff>
--- a/docs/apresentacao/apresentacao.pptx
+++ b/docs/apresentacao/apresentacao.pptx
@@ -204,7 +204,7 @@
           <a:p>
             <a:fld id="{2BDE29EE-9B87-419F-AF79-1B2A070670AC}" type="datetimeFigureOut">
               <a:rPr lang="pt-BR" smtClean="0"/>
-              <a:t>16/04/2022</a:t>
+              <a:t>17/04/2022</a:t>
             </a:fld>
             <a:endParaRPr lang="pt-BR"/>
           </a:p>
@@ -362,7 +362,7 @@
           <a:p>
             <a:fld id="{D39DF2EA-979D-4B16-A3DC-40115D39A058}" type="slidenum">
               <a:rPr lang="pt-BR" smtClean="0"/>
-              <a:t>‹nº›</a:t>
+              <a:t>‹#›</a:t>
             </a:fld>
             <a:endParaRPr lang="pt-BR"/>
           </a:p>
@@ -9264,7 +9264,7 @@
           <a:p>
             <a:fld id="{DC3F9AA5-1F73-45E6-BD6D-7E2F5AFE1A15}" type="datetimeFigureOut">
               <a:rPr lang="pt-BR" smtClean="0"/>
-              <a:t>16/04/2022</a:t>
+              <a:t>17/04/2022</a:t>
             </a:fld>
             <a:endParaRPr lang="pt-BR"/>
           </a:p>
@@ -9306,7 +9306,7 @@
           <a:p>
             <a:fld id="{EB191585-A94C-4D80-8A82-6D256DD97170}" type="slidenum">
               <a:rPr lang="pt-BR" smtClean="0"/>
-              <a:t>‹nº›</a:t>
+              <a:t>‹#›</a:t>
             </a:fld>
             <a:endParaRPr lang="pt-BR"/>
           </a:p>
@@ -9471,7 +9471,7 @@
           <a:p>
             <a:fld id="{DC3F9AA5-1F73-45E6-BD6D-7E2F5AFE1A15}" type="datetimeFigureOut">
               <a:rPr lang="pt-BR" smtClean="0"/>
-              <a:t>16/04/2022</a:t>
+              <a:t>17/04/2022</a:t>
             </a:fld>
             <a:endParaRPr lang="pt-BR"/>
           </a:p>
@@ -9513,7 +9513,7 @@
           <a:p>
             <a:fld id="{EB191585-A94C-4D80-8A82-6D256DD97170}" type="slidenum">
               <a:rPr lang="pt-BR" smtClean="0"/>
-              <a:t>‹nº›</a:t>
+              <a:t>‹#›</a:t>
             </a:fld>
             <a:endParaRPr lang="pt-BR"/>
           </a:p>
@@ -9651,7 +9651,7 @@
           <a:p>
             <a:fld id="{DC3F9AA5-1F73-45E6-BD6D-7E2F5AFE1A15}" type="datetimeFigureOut">
               <a:rPr lang="pt-BR" smtClean="0"/>
-              <a:t>16/04/2022</a:t>
+              <a:t>17/04/2022</a:t>
             </a:fld>
             <a:endParaRPr lang="pt-BR"/>
           </a:p>
@@ -9693,7 +9693,7 @@
           <a:p>
             <a:fld id="{EB191585-A94C-4D80-8A82-6D256DD97170}" type="slidenum">
               <a:rPr lang="pt-BR" smtClean="0"/>
-              <a:t>‹nº›</a:t>
+              <a:t>‹#›</a:t>
             </a:fld>
             <a:endParaRPr lang="pt-BR"/>
           </a:p>
@@ -9856,7 +9856,7 @@
           <a:p>
             <a:fld id="{DC3F9AA5-1F73-45E6-BD6D-7E2F5AFE1A15}" type="datetimeFigureOut">
               <a:rPr lang="pt-BR" smtClean="0"/>
-              <a:t>16/04/2022</a:t>
+              <a:t>17/04/2022</a:t>
             </a:fld>
             <a:endParaRPr lang="pt-BR"/>
           </a:p>
@@ -9898,7 +9898,7 @@
           <a:p>
             <a:fld id="{EB191585-A94C-4D80-8A82-6D256DD97170}" type="slidenum">
               <a:rPr lang="pt-BR" smtClean="0"/>
-              <a:t>‹nº›</a:t>
+              <a:t>‹#›</a:t>
             </a:fld>
             <a:endParaRPr lang="pt-BR"/>
           </a:p>
@@ -18754,7 +18754,7 @@
           <a:p>
             <a:fld id="{DC3F9AA5-1F73-45E6-BD6D-7E2F5AFE1A15}" type="datetimeFigureOut">
               <a:rPr lang="pt-BR" smtClean="0"/>
-              <a:t>16/04/2022</a:t>
+              <a:t>17/04/2022</a:t>
             </a:fld>
             <a:endParaRPr lang="pt-BR"/>
           </a:p>
@@ -18796,7 +18796,7 @@
           <a:p>
             <a:fld id="{EB191585-A94C-4D80-8A82-6D256DD97170}" type="slidenum">
               <a:rPr lang="pt-BR" smtClean="0"/>
-              <a:t>‹nº›</a:t>
+              <a:t>‹#›</a:t>
             </a:fld>
             <a:endParaRPr lang="pt-BR"/>
           </a:p>
@@ -19028,7 +19028,7 @@
           <a:p>
             <a:fld id="{DC3F9AA5-1F73-45E6-BD6D-7E2F5AFE1A15}" type="datetimeFigureOut">
               <a:rPr lang="pt-BR" smtClean="0"/>
-              <a:t>16/04/2022</a:t>
+              <a:t>17/04/2022</a:t>
             </a:fld>
             <a:endParaRPr lang="pt-BR"/>
           </a:p>
@@ -19070,7 +19070,7 @@
           <a:p>
             <a:fld id="{EB191585-A94C-4D80-8A82-6D256DD97170}" type="slidenum">
               <a:rPr lang="pt-BR" smtClean="0"/>
-              <a:t>‹nº›</a:t>
+              <a:t>‹#›</a:t>
             </a:fld>
             <a:endParaRPr lang="pt-BR"/>
           </a:p>
@@ -19426,7 +19426,7 @@
           <a:p>
             <a:fld id="{DC3F9AA5-1F73-45E6-BD6D-7E2F5AFE1A15}" type="datetimeFigureOut">
               <a:rPr lang="pt-BR" smtClean="0"/>
-              <a:t>16/04/2022</a:t>
+              <a:t>17/04/2022</a:t>
             </a:fld>
             <a:endParaRPr lang="pt-BR"/>
           </a:p>
@@ -19468,7 +19468,7 @@
           <a:p>
             <a:fld id="{EB191585-A94C-4D80-8A82-6D256DD97170}" type="slidenum">
               <a:rPr lang="pt-BR" smtClean="0"/>
-              <a:t>‹nº›</a:t>
+              <a:t>‹#›</a:t>
             </a:fld>
             <a:endParaRPr lang="pt-BR"/>
           </a:p>
@@ -19544,7 +19544,7 @@
           <a:p>
             <a:fld id="{DC3F9AA5-1F73-45E6-BD6D-7E2F5AFE1A15}" type="datetimeFigureOut">
               <a:rPr lang="pt-BR" smtClean="0"/>
-              <a:t>16/04/2022</a:t>
+              <a:t>17/04/2022</a:t>
             </a:fld>
             <a:endParaRPr lang="pt-BR"/>
           </a:p>
@@ -19586,7 +19586,7 @@
           <a:p>
             <a:fld id="{EB191585-A94C-4D80-8A82-6D256DD97170}" type="slidenum">
               <a:rPr lang="pt-BR" smtClean="0"/>
-              <a:t>‹nº›</a:t>
+              <a:t>‹#›</a:t>
             </a:fld>
             <a:endParaRPr lang="pt-BR"/>
           </a:p>
@@ -19639,7 +19639,7 @@
           <a:p>
             <a:fld id="{DC3F9AA5-1F73-45E6-BD6D-7E2F5AFE1A15}" type="datetimeFigureOut">
               <a:rPr lang="pt-BR" smtClean="0"/>
-              <a:t>16/04/2022</a:t>
+              <a:t>17/04/2022</a:t>
             </a:fld>
             <a:endParaRPr lang="pt-BR"/>
           </a:p>
@@ -19681,7 +19681,7 @@
           <a:p>
             <a:fld id="{EB191585-A94C-4D80-8A82-6D256DD97170}" type="slidenum">
               <a:rPr lang="pt-BR" smtClean="0"/>
-              <a:t>‹nº›</a:t>
+              <a:t>‹#›</a:t>
             </a:fld>
             <a:endParaRPr lang="pt-BR"/>
           </a:p>
@@ -19929,7 +19929,7 @@
           <a:p>
             <a:fld id="{DC3F9AA5-1F73-45E6-BD6D-7E2F5AFE1A15}" type="datetimeFigureOut">
               <a:rPr lang="pt-BR" smtClean="0"/>
-              <a:t>16/04/2022</a:t>
+              <a:t>17/04/2022</a:t>
             </a:fld>
             <a:endParaRPr lang="pt-BR"/>
           </a:p>
@@ -19971,7 +19971,7 @@
           <a:p>
             <a:fld id="{EB191585-A94C-4D80-8A82-6D256DD97170}" type="slidenum">
               <a:rPr lang="pt-BR" smtClean="0"/>
-              <a:t>‹nº›</a:t>
+              <a:t>‹#›</a:t>
             </a:fld>
             <a:endParaRPr lang="pt-BR"/>
           </a:p>
@@ -20209,7 +20209,7 @@
           <a:p>
             <a:fld id="{DC3F9AA5-1F73-45E6-BD6D-7E2F5AFE1A15}" type="datetimeFigureOut">
               <a:rPr lang="pt-BR" smtClean="0"/>
-              <a:t>16/04/2022</a:t>
+              <a:t>17/04/2022</a:t>
             </a:fld>
             <a:endParaRPr lang="pt-BR"/>
           </a:p>
@@ -20251,7 +20251,7 @@
           <a:p>
             <a:fld id="{EB191585-A94C-4D80-8A82-6D256DD97170}" type="slidenum">
               <a:rPr lang="pt-BR" smtClean="0"/>
-              <a:t>‹nº›</a:t>
+              <a:t>‹#›</a:t>
             </a:fld>
             <a:endParaRPr lang="pt-BR"/>
           </a:p>
@@ -20459,7 +20459,7 @@
           <a:p>
             <a:fld id="{DC3F9AA5-1F73-45E6-BD6D-7E2F5AFE1A15}" type="datetimeFigureOut">
               <a:rPr lang="pt-BR" smtClean="0"/>
-              <a:t>16/04/2022</a:t>
+              <a:t>17/04/2022</a:t>
             </a:fld>
             <a:endParaRPr lang="pt-BR"/>
           </a:p>
@@ -20541,7 +20541,7 @@
           <a:p>
             <a:fld id="{EB191585-A94C-4D80-8A82-6D256DD97170}" type="slidenum">
               <a:rPr lang="pt-BR" smtClean="0"/>
-              <a:t>‹nº›</a:t>
+              <a:t>‹#›</a:t>
             </a:fld>
             <a:endParaRPr lang="pt-BR"/>
           </a:p>
@@ -21969,13 +21969,13 @@
         </p:nvSpPr>
         <p:spPr>
           <a:xfrm>
-            <a:off x="1158351" y="3876805"/>
+            <a:off x="1158351" y="3797293"/>
             <a:ext cx="3816320" cy="2819409"/>
           </a:xfrm>
         </p:spPr>
         <p:txBody>
           <a:bodyPr>
-            <a:normAutofit/>
+            <a:normAutofit lnSpcReduction="10000"/>
           </a:bodyPr>
           <a:lstStyle/>
           <a:p>
@@ -21996,7 +21996,7 @@
               <a:buChar char="§"/>
             </a:pPr>
             <a:r>
-              <a:rPr lang="pt-BR" dirty="0"/>
+              <a:rPr lang="pt-BR" sz="1800" dirty="0"/>
               <a:t>Não necessário fazer login</a:t>
             </a:r>
           </a:p>
@@ -22006,7 +22006,21 @@
               <a:buChar char="§"/>
             </a:pPr>
             <a:r>
-              <a:rPr lang="pt-BR" dirty="0"/>
+              <a:rPr lang="pt-BR" sz="1800" dirty="0" err="1"/>
+              <a:t>Favoritar</a:t>
+            </a:r>
+            <a:r>
+              <a:rPr lang="pt-BR" sz="1800" dirty="0"/>
+              <a:t> estabelecimento</a:t>
+            </a:r>
+          </a:p>
+          <a:p>
+            <a:pPr marL="266700" indent="-266700">
+              <a:buFont typeface="Wingdings" panose="05000000000000000000" pitchFamily="2" charset="2"/>
+              <a:buChar char="§"/>
+            </a:pPr>
+            <a:r>
+              <a:rPr lang="pt-BR" sz="1800" dirty="0"/>
               <a:t>Cadastro do comercio</a:t>
             </a:r>
           </a:p>
@@ -22016,7 +22030,7 @@
               <a:buChar char="§"/>
             </a:pPr>
             <a:r>
-              <a:rPr lang="pt-BR" dirty="0"/>
+              <a:rPr lang="pt-BR" sz="1800" dirty="0"/>
               <a:t>Permitir alteração dos dados</a:t>
             </a:r>
           </a:p>
@@ -22026,7 +22040,7 @@
               <a:buChar char="§"/>
             </a:pPr>
             <a:r>
-              <a:rPr lang="pt-BR" dirty="0"/>
+              <a:rPr lang="pt-BR" sz="1800" dirty="0"/>
               <a:t>Listagem de ofertas</a:t>
             </a:r>
           </a:p>
@@ -22106,7 +22120,7 @@
         <p:spPr>
           <a:xfrm>
             <a:off x="5388706" y="4280726"/>
-            <a:ext cx="3175946" cy="984885"/>
+            <a:ext cx="3175946" cy="1538883"/>
           </a:xfrm>
           <a:prstGeom prst="rect">
             <a:avLst/>
@@ -22158,7 +22172,33 @@
             </a:pPr>
             <a:r>
               <a:rPr lang="pt-BR" dirty="0"/>
-              <a:t>CSS /HTML/ CSS</a:t>
+              <a:t>CSS /HTML/ Javascript</a:t>
+            </a:r>
+          </a:p>
+          <a:p>
+            <a:pPr marL="285750" indent="-285750">
+              <a:buClr>
+                <a:schemeClr val="accent1"/>
+              </a:buClr>
+              <a:buFont typeface="Wingdings" panose="05000000000000000000" pitchFamily="2" charset="2"/>
+              <a:buChar char="§"/>
+            </a:pPr>
+            <a:r>
+              <a:rPr lang="pt-BR" dirty="0"/>
+              <a:t>Ser multiplataforma</a:t>
+            </a:r>
+          </a:p>
+          <a:p>
+            <a:pPr marL="285750" indent="-285750">
+              <a:buClr>
+                <a:schemeClr val="accent1"/>
+              </a:buClr>
+              <a:buFont typeface="Wingdings" panose="05000000000000000000" pitchFamily="2" charset="2"/>
+              <a:buChar char="§"/>
+            </a:pPr>
+            <a:r>
+              <a:rPr lang="pt-BR" dirty="0"/>
+              <a:t>Ser usado offline</a:t>
             </a:r>
           </a:p>
         </p:txBody>

</xml_diff>